<commit_message>
Screenshot fixed for ML demo slide
</commit_message>
<xml_diff>
--- a/09. Intro-to-Azure/Intro-to-Azure.pptx
+++ b/09. Intro-to-Azure/Intro-to-Azure.pptx
@@ -12255,11 +12255,7 @@
           <a:p>
             <a:r>
               <a:rPr lang="en-US" sz="6000" dirty="0" smtClean="0"/>
-              <a:t>Introduction to </a:t>
-            </a:r>
-            <a:r>
-              <a:rPr lang="en-US" sz="6000" dirty="0" smtClean="0"/>
-              <a:t>Azure</a:t>
+              <a:t>Introduction to Azure</a:t>
             </a:r>
             <a:endParaRPr lang="en-US" sz="6000" dirty="0"/>
           </a:p>
@@ -15382,6 +15378,43 @@
           <a:chExt cx="0" cy="0"/>
         </a:xfrm>
       </p:grpSpPr>
+      <p:pic>
+        <p:nvPicPr>
+          <p:cNvPr id="2" name="Picture 1"/>
+          <p:cNvPicPr>
+            <a:picLocks noChangeAspect="1"/>
+          </p:cNvPicPr>
+          <p:nvPr/>
+        </p:nvPicPr>
+        <p:blipFill>
+          <a:blip r:embed="rId2"/>
+          <a:stretch>
+            <a:fillRect/>
+          </a:stretch>
+        </p:blipFill>
+        <p:spPr>
+          <a:xfrm>
+            <a:off x="1230913" y="729174"/>
+            <a:ext cx="6682173" cy="2821746"/>
+          </a:xfrm>
+          <a:prstGeom prst="roundRect">
+            <a:avLst>
+              <a:gd name="adj" fmla="val 0"/>
+            </a:avLst>
+          </a:prstGeom>
+          <a:solidFill>
+            <a:srgbClr val="FFFFFF">
+              <a:shade val="85000"/>
+            </a:srgbClr>
+          </a:solidFill>
+          <a:ln>
+            <a:noFill/>
+          </a:ln>
+          <a:effectLst>
+            <a:reflection blurRad="12700" stA="38000" endPos="28000" dist="5000" dir="5400000" sy="-100000" algn="bl" rotWithShape="0"/>
+          </a:effectLst>
+        </p:spPr>
+      </p:pic>
       <p:sp>
         <p:nvSpPr>
           <p:cNvPr id="5" name="Title 4"/>
@@ -15410,43 +15443,6 @@
           </a:p>
         </p:txBody>
       </p:sp>
-      <p:pic>
-        <p:nvPicPr>
-          <p:cNvPr id="7" name="Picture 6"/>
-          <p:cNvPicPr>
-            <a:picLocks noChangeAspect="1"/>
-          </p:cNvPicPr>
-          <p:nvPr/>
-        </p:nvPicPr>
-        <p:blipFill>
-          <a:blip r:embed="rId2"/>
-          <a:stretch>
-            <a:fillRect/>
-          </a:stretch>
-        </p:blipFill>
-        <p:spPr>
-          <a:xfrm>
-            <a:off x="1915224" y="464127"/>
-            <a:ext cx="5313552" cy="3124200"/>
-          </a:xfrm>
-          <a:prstGeom prst="roundRect">
-            <a:avLst>
-              <a:gd name="adj" fmla="val 0"/>
-            </a:avLst>
-          </a:prstGeom>
-          <a:solidFill>
-            <a:srgbClr val="FFFFFF">
-              <a:shade val="85000"/>
-            </a:srgbClr>
-          </a:solidFill>
-          <a:ln>
-            <a:noFill/>
-          </a:ln>
-          <a:effectLst>
-            <a:reflection blurRad="12700" stA="38000" endPos="28000" dist="5000" dir="5400000" sy="-100000" algn="bl" rotWithShape="0"/>
-          </a:effectLst>
-        </p:spPr>
-      </p:pic>
       <p:sp>
         <p:nvSpPr>
           <p:cNvPr id="6" name="Subtitle 5"/>

</xml_diff>